<commit_message>
update weekly discussion leaders
</commit_message>
<xml_diff>
--- a/slides/week3/Submitting Exercises.pptx
+++ b/slides/week3/Submitting Exercises.pptx
@@ -12,6 +12,7 @@
     <p:sldId id="259" r:id="rId6"/>
     <p:sldId id="258" r:id="rId7"/>
     <p:sldId id="262" r:id="rId8"/>
+    <p:sldId id="263" r:id="rId9"/>
   </p:sldIdLst>
   <p:sldSz cx="12192000" cy="6858000"/>
   <p:notesSz cx="6858000" cy="9144000"/>
@@ -110,7 +111,65 @@
       </a:defRPr>
     </a:lvl9pPr>
   </p:defaultTextStyle>
+  <p:extLst>
+    <p:ext uri="{EFAFB233-063F-42B5-8137-9DF3F51BA10A}">
+      <p15:sldGuideLst xmlns:p15="http://schemas.microsoft.com/office/powerpoint/2012/main"/>
+    </p:ext>
+  </p:extLst>
 </p:presentation>
+</file>
+
+<file path=ppt/revisionInfo.xml><?xml version="1.0" encoding="utf-8"?>
+<p1510:revInfo xmlns:a="http://schemas.openxmlformats.org/drawingml/2006/main" xmlns:r="http://schemas.openxmlformats.org/officeDocument/2006/relationships" xmlns:p1510="http://schemas.microsoft.com/office/powerpoint/2015/10/main">
+  <p1510:revLst>
+    <p1510:client id="{E5D11353-EC51-4CAD-903E-33B61406C2BC}" v="3" dt="2025-02-07T21:50:45.171"/>
+  </p1510:revLst>
+</p1510:revInfo>
+</file>
+
+<file path=ppt/changesInfos/changesInfo1.xml><?xml version="1.0" encoding="utf-8"?>
+<pc:chgInfo xmlns:a="http://schemas.openxmlformats.org/drawingml/2006/main" xmlns:r="http://schemas.openxmlformats.org/officeDocument/2006/relationships" xmlns:ac="http://schemas.microsoft.com/office/drawing/2013/main/command" xmlns:pc="http://schemas.microsoft.com/office/powerpoint/2013/main/command">
+  <pc:docChgLst>
+    <pc:chgData name="Alyssa Pivirotto" userId="dfabcb7c-8811-4e4d-80fc-773b016eaa6f" providerId="ADAL" clId="{E5D11353-EC51-4CAD-903E-33B61406C2BC}"/>
+    <pc:docChg chg="custSel addSld modSld">
+      <pc:chgData name="Alyssa Pivirotto" userId="dfabcb7c-8811-4e4d-80fc-773b016eaa6f" providerId="ADAL" clId="{E5D11353-EC51-4CAD-903E-33B61406C2BC}" dt="2025-02-07T21:54:17.499" v="412" actId="20577"/>
+      <pc:docMkLst>
+        <pc:docMk/>
+      </pc:docMkLst>
+      <pc:sldChg chg="addSp modSp new mod">
+        <pc:chgData name="Alyssa Pivirotto" userId="dfabcb7c-8811-4e4d-80fc-773b016eaa6f" providerId="ADAL" clId="{E5D11353-EC51-4CAD-903E-33B61406C2BC}" dt="2025-02-07T21:54:17.499" v="412" actId="20577"/>
+        <pc:sldMkLst>
+          <pc:docMk/>
+          <pc:sldMk cId="1372453934" sldId="263"/>
+        </pc:sldMkLst>
+        <pc:spChg chg="add mod">
+          <ac:chgData name="Alyssa Pivirotto" userId="dfabcb7c-8811-4e4d-80fc-773b016eaa6f" providerId="ADAL" clId="{E5D11353-EC51-4CAD-903E-33B61406C2BC}" dt="2025-02-07T21:54:17.499" v="412" actId="20577"/>
+          <ac:spMkLst>
+            <pc:docMk/>
+            <pc:sldMk cId="1372453934" sldId="263"/>
+            <ac:spMk id="8" creationId="{F9338D8D-6F63-9E59-9023-671141E64EC3}"/>
+          </ac:spMkLst>
+        </pc:spChg>
+        <pc:picChg chg="add mod modCrop">
+          <ac:chgData name="Alyssa Pivirotto" userId="dfabcb7c-8811-4e4d-80fc-773b016eaa6f" providerId="ADAL" clId="{E5D11353-EC51-4CAD-903E-33B61406C2BC}" dt="2025-02-07T21:50:18.869" v="6" actId="1076"/>
+          <ac:picMkLst>
+            <pc:docMk/>
+            <pc:sldMk cId="1372453934" sldId="263"/>
+            <ac:picMk id="4" creationId="{BDB8261C-CEF4-A950-3FC6-66409082F5BD}"/>
+          </ac:picMkLst>
+        </pc:picChg>
+        <pc:cxnChg chg="add mod">
+          <ac:chgData name="Alyssa Pivirotto" userId="dfabcb7c-8811-4e4d-80fc-773b016eaa6f" providerId="ADAL" clId="{E5D11353-EC51-4CAD-903E-33B61406C2BC}" dt="2025-02-07T21:50:34.779" v="10" actId="14100"/>
+          <ac:cxnSpMkLst>
+            <pc:docMk/>
+            <pc:sldMk cId="1372453934" sldId="263"/>
+            <ac:cxnSpMk id="5" creationId="{E0A3A5FD-27EA-86C6-73E9-57C075E7A40A}"/>
+          </ac:cxnSpMkLst>
+        </pc:cxnChg>
+      </pc:sldChg>
+    </pc:docChg>
+  </pc:docChgLst>
+</pc:chgInfo>
 </file>
 
 <file path=ppt/slideLayouts/slideLayout1.xml><?xml version="1.0" encoding="utf-8"?>
@@ -4507,13 +4566,8 @@
           <a:p>
             <a:r>
               <a:rPr lang="en-US" sz="3200" dirty="0"/>
-              <a:t>6. You can check to make sure this worked by looking for your commit message in </a:t>
-            </a:r>
-            <a:r>
-              <a:rPr lang="en-US" sz="3200"/>
-              <a:t>your repository.  </a:t>
-            </a:r>
-            <a:endParaRPr lang="en-US" sz="3200" dirty="0"/>
+              <a:t>6. You can check to make sure this worked by looking for your commit message in your repository.  </a:t>
+            </a:r>
           </a:p>
         </p:txBody>
       </p:sp>
@@ -4521,6 +4575,197 @@
     <p:extLst>
       <p:ext uri="{BB962C8B-B14F-4D97-AF65-F5344CB8AC3E}">
         <p14:creationId xmlns:p14="http://schemas.microsoft.com/office/powerpoint/2010/main" val="869567128"/>
+      </p:ext>
+    </p:extLst>
+  </p:cSld>
+  <p:clrMapOvr>
+    <a:masterClrMapping/>
+  </p:clrMapOvr>
+</p:sld>
+</file>
+
+<file path=ppt/slides/slide8.xml><?xml version="1.0" encoding="utf-8"?>
+<p:sld xmlns:a="http://schemas.openxmlformats.org/drawingml/2006/main" xmlns:r="http://schemas.openxmlformats.org/officeDocument/2006/relationships" xmlns:p="http://schemas.openxmlformats.org/presentationml/2006/main">
+  <p:cSld>
+    <p:spTree>
+      <p:nvGrpSpPr>
+        <p:cNvPr id="1" name=""/>
+        <p:cNvGrpSpPr/>
+        <p:nvPr/>
+      </p:nvGrpSpPr>
+      <p:grpSpPr>
+        <a:xfrm>
+          <a:off x="0" y="0"/>
+          <a:ext cx="0" cy="0"/>
+          <a:chOff x="0" y="0"/>
+          <a:chExt cx="0" cy="0"/>
+        </a:xfrm>
+      </p:grpSpPr>
+      <p:sp>
+        <p:nvSpPr>
+          <p:cNvPr id="2" name="Title 1">
+            <a:extLst>
+              <a:ext uri="{FF2B5EF4-FFF2-40B4-BE49-F238E27FC236}">
+                <a16:creationId xmlns:a16="http://schemas.microsoft.com/office/drawing/2014/main" id="{0329FD98-6735-616F-F826-913AC2EE34D9}"/>
+              </a:ext>
+            </a:extLst>
+          </p:cNvPr>
+          <p:cNvSpPr>
+            <a:spLocks noGrp="1"/>
+          </p:cNvSpPr>
+          <p:nvPr>
+            <p:ph type="title"/>
+          </p:nvPr>
+        </p:nvSpPr>
+        <p:spPr/>
+        <p:txBody>
+          <a:bodyPr/>
+          <a:lstStyle/>
+          <a:p>
+            <a:endParaRPr lang="en-US"/>
+          </a:p>
+        </p:txBody>
+      </p:sp>
+      <p:pic>
+        <p:nvPicPr>
+          <p:cNvPr id="4" name="Picture 3" descr="A screenshot of a computer&#10;&#10;AI-generated content may be incorrect.">
+            <a:extLst>
+              <a:ext uri="{FF2B5EF4-FFF2-40B4-BE49-F238E27FC236}">
+                <a16:creationId xmlns:a16="http://schemas.microsoft.com/office/drawing/2014/main" id="{BDB8261C-CEF4-A950-3FC6-66409082F5BD}"/>
+              </a:ext>
+            </a:extLst>
+          </p:cNvPr>
+          <p:cNvPicPr>
+            <a:picLocks noChangeAspect="1"/>
+          </p:cNvPicPr>
+          <p:nvPr/>
+        </p:nvPicPr>
+        <p:blipFill>
+          <a:blip r:embed="rId2">
+            <a:extLst>
+              <a:ext uri="{28A0092B-C50C-407E-A947-70E740481C1C}">
+                <a14:useLocalDpi xmlns:a14="http://schemas.microsoft.com/office/drawing/2010/main" val="0"/>
+              </a:ext>
+            </a:extLst>
+          </a:blip>
+          <a:srcRect t="11767" r="13750"/>
+          <a:stretch/>
+        </p:blipFill>
+        <p:spPr>
+          <a:xfrm>
+            <a:off x="838200" y="228600"/>
+            <a:ext cx="10515600" cy="5782056"/>
+          </a:xfrm>
+          <a:prstGeom prst="rect">
+            <a:avLst/>
+          </a:prstGeom>
+        </p:spPr>
+      </p:pic>
+      <p:cxnSp>
+        <p:nvCxnSpPr>
+          <p:cNvPr id="5" name="Straight Arrow Connector 4">
+            <a:extLst>
+              <a:ext uri="{FF2B5EF4-FFF2-40B4-BE49-F238E27FC236}">
+                <a16:creationId xmlns:a16="http://schemas.microsoft.com/office/drawing/2014/main" id="{E0A3A5FD-27EA-86C6-73E9-57C075E7A40A}"/>
+              </a:ext>
+            </a:extLst>
+          </p:cNvPr>
+          <p:cNvCxnSpPr>
+            <a:cxnSpLocks/>
+          </p:cNvCxnSpPr>
+          <p:nvPr/>
+        </p:nvCxnSpPr>
+        <p:spPr>
+          <a:xfrm flipH="1">
+            <a:off x="3209544" y="3246120"/>
+            <a:ext cx="1719072" cy="0"/>
+          </a:xfrm>
+          <a:prstGeom prst="straightConnector1">
+            <a:avLst/>
+          </a:prstGeom>
+          <a:ln w="76200">
+            <a:solidFill>
+              <a:srgbClr val="92D050"/>
+            </a:solidFill>
+            <a:tailEnd type="triangle"/>
+          </a:ln>
+        </p:spPr>
+        <p:style>
+          <a:lnRef idx="2">
+            <a:schemeClr val="accent1"/>
+          </a:lnRef>
+          <a:fillRef idx="0">
+            <a:schemeClr val="accent1"/>
+          </a:fillRef>
+          <a:effectRef idx="1">
+            <a:schemeClr val="accent1"/>
+          </a:effectRef>
+          <a:fontRef idx="minor">
+            <a:schemeClr val="tx1"/>
+          </a:fontRef>
+        </p:style>
+      </p:cxnSp>
+      <p:sp>
+        <p:nvSpPr>
+          <p:cNvPr id="8" name="Title 1">
+            <a:extLst>
+              <a:ext uri="{FF2B5EF4-FFF2-40B4-BE49-F238E27FC236}">
+                <a16:creationId xmlns:a16="http://schemas.microsoft.com/office/drawing/2014/main" id="{F9338D8D-6F63-9E59-9023-671141E64EC3}"/>
+              </a:ext>
+            </a:extLst>
+          </p:cNvPr>
+          <p:cNvSpPr txBox="1">
+            <a:spLocks/>
+          </p:cNvSpPr>
+          <p:nvPr/>
+        </p:nvSpPr>
+        <p:spPr>
+          <a:xfrm>
+            <a:off x="113730" y="5805662"/>
+            <a:ext cx="11964540" cy="976138"/>
+          </a:xfrm>
+          <a:prstGeom prst="rect">
+            <a:avLst/>
+          </a:prstGeom>
+          <a:solidFill>
+            <a:schemeClr val="bg1"/>
+          </a:solidFill>
+        </p:spPr>
+        <p:txBody>
+          <a:bodyPr vert="horz" lIns="91440" tIns="45720" rIns="91440" bIns="45720" rtlCol="0" anchor="ctr">
+            <a:normAutofit fontScale="82500" lnSpcReduction="20000"/>
+          </a:bodyPr>
+          <a:lstStyle>
+            <a:lvl1pPr algn="l" defTabSz="914400" rtl="0" eaLnBrk="1" latinLnBrk="0" hangingPunct="1">
+              <a:lnSpc>
+                <a:spcPct val="90000"/>
+              </a:lnSpc>
+              <a:spcBef>
+                <a:spcPct val="0"/>
+              </a:spcBef>
+              <a:buNone/>
+              <a:defRPr sz="4400" kern="1200">
+                <a:solidFill>
+                  <a:schemeClr val="tx1"/>
+                </a:solidFill>
+                <a:latin typeface="+mj-lt"/>
+                <a:ea typeface="+mj-ea"/>
+                <a:cs typeface="+mj-cs"/>
+              </a:defRPr>
+            </a:lvl1pPr>
+          </a:lstStyle>
+          <a:p>
+            <a:r>
+              <a:rPr lang="en-US" sz="3200" dirty="0"/>
+              <a:t>If you have issues making commits or syncing the changes, please download your file and email me the file. You can do this by right-clicking on the Jupyter Notebook file in the ‘Explorer’ tab and then selecting the ‘Download…’ option. </a:t>
+            </a:r>
+          </a:p>
+        </p:txBody>
+      </p:sp>
+    </p:spTree>
+    <p:extLst>
+      <p:ext uri="{BB962C8B-B14F-4D97-AF65-F5344CB8AC3E}">
+        <p14:creationId xmlns:p14="http://schemas.microsoft.com/office/powerpoint/2010/main" val="1372453934"/>
       </p:ext>
     </p:extLst>
   </p:cSld>

</xml_diff>